<commit_message>
Adding final changes to powerpoint presentation
</commit_message>
<xml_diff>
--- a/Google Play™ Store Analysis.pptx
+++ b/Google Play™ Store Analysis.pptx
@@ -5868,7 +5868,7 @@
                   <a:srgbClr val="34A853"/>
                 </a:solidFill>
               </a:rPr>
-              <a:t>Kyle and Mark Peterson</a:t>
+              <a:t>Kyle Peterson and Mark Peterson</a:t>
             </a:r>
           </a:p>
         </p:txBody>
@@ -6067,31 +6067,55 @@
           </a:p>
         </p:txBody>
       </p:sp>
-      <p:sp>
-        <p:nvSpPr>
-          <p:cNvPr id="3" name="Content Placeholder 2">
+      <p:pic>
+        <p:nvPicPr>
+          <p:cNvPr id="1026" name="Picture 2">
             <a:extLst>
               <a:ext uri="{FF2B5EF4-FFF2-40B4-BE49-F238E27FC236}">
-                <a16:creationId xmlns:a16="http://schemas.microsoft.com/office/drawing/2014/main" id="{7C743D9E-B459-46C3-B155-1B7B1F93A5F5}"/>
+                <a16:creationId xmlns:a16="http://schemas.microsoft.com/office/drawing/2014/main" id="{D719BE57-2FF6-4C41-A654-A532ABCF01F6}"/>
               </a:ext>
             </a:extLst>
           </p:cNvPr>
-          <p:cNvSpPr>
-            <a:spLocks noGrp="1"/>
-          </p:cNvSpPr>
+          <p:cNvPicPr>
+            <a:picLocks noGrp="1" noChangeAspect="1" noChangeArrowheads="1"/>
+          </p:cNvPicPr>
           <p:nvPr>
             <p:ph idx="1"/>
           </p:nvPr>
-        </p:nvSpPr>
-        <p:spPr/>
-        <p:txBody>
-          <a:bodyPr/>
-          <a:lstStyle/>
-          <a:p>
-            <a:endParaRPr lang="en-US" dirty="0"/>
-          </a:p>
-        </p:txBody>
-      </p:sp>
+        </p:nvPicPr>
+        <p:blipFill>
+          <a:blip r:embed="rId2">
+            <a:extLst>
+              <a:ext uri="{28A0092B-C50C-407E-A947-70E740481C1C}">
+                <a14:useLocalDpi xmlns:a14="http://schemas.microsoft.com/office/drawing/2010/main" val="0"/>
+              </a:ext>
+            </a:extLst>
+          </a:blip>
+          <a:srcRect/>
+          <a:stretch>
+            <a:fillRect/>
+          </a:stretch>
+        </p:blipFill>
+        <p:spPr bwMode="auto">
+          <a:xfrm>
+            <a:off x="2099387" y="1749724"/>
+            <a:ext cx="5850295" cy="4740937"/>
+          </a:xfrm>
+          <a:prstGeom prst="rect">
+            <a:avLst/>
+          </a:prstGeom>
+          <a:noFill/>
+          <a:extLst>
+            <a:ext uri="{909E8E84-426E-40DD-AFC4-6F175D3DCCD1}">
+              <a14:hiddenFill xmlns:a14="http://schemas.microsoft.com/office/drawing/2010/main">
+                <a:solidFill>
+                  <a:srgbClr val="FFFFFF"/>
+                </a:solidFill>
+              </a14:hiddenFill>
+            </a:ext>
+          </a:extLst>
+        </p:spPr>
+      </p:pic>
     </p:spTree>
     <p:extLst>
       <p:ext uri="{BB962C8B-B14F-4D97-AF65-F5344CB8AC3E}">
@@ -7739,9 +7763,16 @@
             <p:ph idx="1"/>
           </p:nvPr>
         </p:nvSpPr>
-        <p:spPr/>
-        <p:txBody>
-          <a:bodyPr/>
+        <p:spPr>
+          <a:xfrm>
+            <a:off x="677334" y="1409351"/>
+            <a:ext cx="8596668" cy="4632012"/>
+          </a:xfrm>
+        </p:spPr>
+        <p:txBody>
+          <a:bodyPr>
+            <a:normAutofit fontScale="77500" lnSpcReduction="20000"/>
+          </a:bodyPr>
           <a:lstStyle/>
           <a:p>
             <a:pPr>
@@ -7755,7 +7786,39 @@
                   <a:srgbClr val="34A853"/>
                 </a:solidFill>
               </a:rPr>
-              <a:t>It is unlikely for an app to fall below a 4-star rating</a:t>
+              <a:t>It is unlikely for an app to fall below a 4-star rating.  </a:t>
+            </a:r>
+          </a:p>
+          <a:p>
+            <a:pPr marL="0" indent="0">
+              <a:lnSpc>
+                <a:spcPct val="200000"/>
+              </a:lnSpc>
+              <a:buNone/>
+            </a:pPr>
+            <a:r>
+              <a:rPr lang="en-US" dirty="0">
+                <a:solidFill>
+                  <a:srgbClr val="34A853"/>
+                </a:solidFill>
+              </a:rPr>
+              <a:t>        The vast majority of the ratings are between 4 and 5 stars.  </a:t>
+            </a:r>
+          </a:p>
+          <a:p>
+            <a:pPr marL="0" indent="0">
+              <a:lnSpc>
+                <a:spcPct val="200000"/>
+              </a:lnSpc>
+              <a:buNone/>
+            </a:pPr>
+            <a:r>
+              <a:rPr lang="en-US" dirty="0">
+                <a:solidFill>
+                  <a:srgbClr val="34A853"/>
+                </a:solidFill>
+              </a:rPr>
+              <a:t>        With the most common average rating at 4.4 stars out of 5 stars maximum.</a:t>
             </a:r>
           </a:p>
           <a:p>
@@ -7770,7 +7833,55 @@
                   <a:srgbClr val="34A853"/>
                 </a:solidFill>
               </a:rPr>
-              <a:t>Games have the largest average file size, people expect more content from games</a:t>
+              <a:t>On average, Game apps have the largest file size, most installs and reviews. </a:t>
+            </a:r>
+          </a:p>
+          <a:p>
+            <a:pPr marL="0" indent="0">
+              <a:lnSpc>
+                <a:spcPct val="200000"/>
+              </a:lnSpc>
+              <a:buNone/>
+            </a:pPr>
+            <a:r>
+              <a:rPr lang="en-US" dirty="0">
+                <a:solidFill>
+                  <a:srgbClr val="34A853"/>
+                </a:solidFill>
+              </a:rPr>
+              <a:t>        Having almost 50mb and half a million reviews per app.  </a:t>
+            </a:r>
+          </a:p>
+          <a:p>
+            <a:pPr marL="0" indent="0">
+              <a:lnSpc>
+                <a:spcPct val="200000"/>
+              </a:lnSpc>
+              <a:buNone/>
+            </a:pPr>
+            <a:r>
+              <a:rPr lang="en-US" dirty="0">
+                <a:solidFill>
+                  <a:srgbClr val="34A853"/>
+                </a:solidFill>
+              </a:rPr>
+              <a:t>       Most app categories have on average approximately 35mb and less than 250,000 reviews per app.</a:t>
+            </a:r>
+          </a:p>
+          <a:p>
+            <a:pPr marL="0" indent="0">
+              <a:lnSpc>
+                <a:spcPct val="200000"/>
+              </a:lnSpc>
+              <a:buNone/>
+            </a:pPr>
+            <a:r>
+              <a:rPr lang="en-US" dirty="0">
+                <a:solidFill>
+                  <a:srgbClr val="34A853"/>
+                </a:solidFill>
+              </a:rPr>
+              <a:t>       People will most likely expect to get more from a game app.</a:t>
             </a:r>
           </a:p>
           <a:p>
@@ -7785,7 +7896,23 @@
                   <a:srgbClr val="34A853"/>
                 </a:solidFill>
               </a:rPr>
-              <a:t>The average rating for games is near 4 stars</a:t>
+              <a:t>Medical apps seem to be the least installed and reviewed on average per app.  </a:t>
+            </a:r>
+          </a:p>
+          <a:p>
+            <a:pPr marL="0" indent="0">
+              <a:lnSpc>
+                <a:spcPct val="200000"/>
+              </a:lnSpc>
+              <a:buNone/>
+            </a:pPr>
+            <a:r>
+              <a:rPr lang="en-US" dirty="0">
+                <a:solidFill>
+                  <a:srgbClr val="34A853"/>
+                </a:solidFill>
+              </a:rPr>
+              <a:t>        To make a profit in this category, it will most likely need to be a paid for app.</a:t>
             </a:r>
           </a:p>
           <a:p>
@@ -7794,14 +7921,11 @@
                 <a:spcPct val="200000"/>
               </a:lnSpc>
             </a:pPr>
-            <a:r>
-              <a:rPr lang="en-US" dirty="0">
-                <a:solidFill>
-                  <a:srgbClr val="34A853"/>
-                </a:solidFill>
-              </a:rPr>
-              <a:t>People are a lot more likely to leave reviews on games compared to any other app</a:t>
-            </a:r>
+            <a:endParaRPr lang="en-US" dirty="0">
+              <a:solidFill>
+                <a:srgbClr val="34A853"/>
+              </a:solidFill>
+            </a:endParaRPr>
           </a:p>
         </p:txBody>
       </p:sp>

</xml_diff>